<commit_message>
Solucion de la practica evaluativa
</commit_message>
<xml_diff>
--- a/Programación Orientada a Objetos.pptx
+++ b/Programación Orientada a Objetos.pptx
@@ -5,7 +5,7 @@
     <p:sldMasterId id="2147483840" r:id="rId1"/>
   </p:sldMasterIdLst>
   <p:notesMasterIdLst>
-    <p:notesMasterId r:id="rId18"/>
+    <p:notesMasterId r:id="rId19"/>
   </p:notesMasterIdLst>
   <p:sldIdLst>
     <p:sldId id="256" r:id="rId2"/>
@@ -24,6 +24,7 @@
     <p:sldId id="268" r:id="rId15"/>
     <p:sldId id="269" r:id="rId16"/>
     <p:sldId id="270" r:id="rId17"/>
+    <p:sldId id="272" r:id="rId18"/>
   </p:sldIdLst>
   <p:sldSz cx="12192000" cy="6858000"/>
   <p:notesSz cx="6858000" cy="9144000"/>
@@ -16925,7 +16926,7 @@
           <a:p>
             <a:fld id="{C0725F5D-9059-47FB-855F-CBD765F429FA}" type="datetimeFigureOut">
               <a:rPr lang="es-MX" smtClean="0"/>
-              <a:t>06/09/2018</a:t>
+              <a:t>13/09/2018</a:t>
             </a:fld>
             <a:endParaRPr lang="es-MX"/>
           </a:p>
@@ -17764,7 +17765,7 @@
           <a:p>
             <a:fld id="{8B4AF60A-713C-41BA-9788-4C493DDC0A9C}" type="datetimeFigureOut">
               <a:rPr lang="en-US" dirty="0"/>
-              <a:t>9/6/2018</a:t>
+              <a:t>9/13/2018</a:t>
             </a:fld>
             <a:endParaRPr lang="en-US" dirty="0"/>
           </a:p>
@@ -17939,7 +17940,7 @@
           <a:p>
             <a:fld id="{7E5E0FA7-C445-42F7-AF66-A4F5A6FC8A9C}" type="datetimeFigureOut">
               <a:rPr lang="en-US" dirty="0"/>
-              <a:t>9/6/2018</a:t>
+              <a:t>9/13/2018</a:t>
             </a:fld>
             <a:endParaRPr lang="en-US" dirty="0"/>
           </a:p>
@@ -18114,7 +18115,7 @@
           <a:p>
             <a:fld id="{585AC5C5-1A57-4420-8AFB-CE41693A794B}" type="datetimeFigureOut">
               <a:rPr lang="en-US" dirty="0"/>
-              <a:t>9/6/2018</a:t>
+              <a:t>9/13/2018</a:t>
             </a:fld>
             <a:endParaRPr lang="en-US" dirty="0"/>
           </a:p>
@@ -18279,7 +18280,7 @@
           <a:p>
             <a:fld id="{8A4C08AF-84E6-4329-8E67-FEA434B47075}" type="datetimeFigureOut">
               <a:rPr lang="en-US" dirty="0"/>
-              <a:t>9/6/2018</a:t>
+              <a:t>9/13/2018</a:t>
             </a:fld>
             <a:endParaRPr lang="en-US" dirty="0"/>
           </a:p>
@@ -18587,7 +18588,7 @@
           <a:p>
             <a:fld id="{4F6EE328-6AFF-436B-881F-213D56084544}" type="datetimeFigureOut">
               <a:rPr lang="en-US" dirty="0"/>
-              <a:t>9/6/2018</a:t>
+              <a:t>9/13/2018</a:t>
             </a:fld>
             <a:endParaRPr lang="en-US" dirty="0"/>
           </a:p>
@@ -18969,7 +18970,7 @@
           <a:p>
             <a:fld id="{AE02069A-09EE-4C7C-86A4-2314A404921D}" type="datetimeFigureOut">
               <a:rPr lang="en-US" dirty="0"/>
-              <a:t>9/6/2018</a:t>
+              <a:t>9/13/2018</a:t>
             </a:fld>
             <a:endParaRPr lang="en-US" dirty="0"/>
           </a:p>
@@ -19398,7 +19399,7 @@
           <a:p>
             <a:fld id="{D56EE7F1-171E-411F-96CA-A251A21496E7}" type="datetimeFigureOut">
               <a:rPr lang="en-US" dirty="0"/>
-              <a:t>9/6/2018</a:t>
+              <a:t>9/13/2018</a:t>
             </a:fld>
             <a:endParaRPr lang="en-US" dirty="0"/>
           </a:p>
@@ -19511,7 +19512,7 @@
           <a:p>
             <a:fld id="{8872C98D-A273-4547-9B92-97D7769F71A6}" type="datetimeFigureOut">
               <a:rPr lang="en-US" dirty="0"/>
-              <a:t>9/6/2018</a:t>
+              <a:t>9/13/2018</a:t>
             </a:fld>
             <a:endParaRPr lang="en-US" dirty="0"/>
           </a:p>
@@ -19601,7 +19602,7 @@
           <a:p>
             <a:fld id="{BAB7CD67-0644-446C-B2AD-1C09BF34F286}" type="datetimeFigureOut">
               <a:rPr lang="en-US" dirty="0"/>
-              <a:t>9/6/2018</a:t>
+              <a:t>9/13/2018</a:t>
             </a:fld>
             <a:endParaRPr lang="en-US" dirty="0"/>
           </a:p>
@@ -19946,7 +19947,7 @@
           <a:p>
             <a:fld id="{81480828-6983-48AD-9E27-CBD3696F837E}" type="datetimeFigureOut">
               <a:rPr lang="en-US" dirty="0"/>
-              <a:t>9/6/2018</a:t>
+              <a:t>9/13/2018</a:t>
             </a:fld>
             <a:endParaRPr lang="en-US" dirty="0"/>
           </a:p>
@@ -20366,7 +20367,7 @@
           <a:p>
             <a:fld id="{2C5EFB91-0324-450E-B17F-36DC0ECCE413}" type="datetimeFigureOut">
               <a:rPr lang="en-US" dirty="0"/>
-              <a:t>9/6/2018</a:t>
+              <a:t>9/13/2018</a:t>
             </a:fld>
             <a:endParaRPr lang="en-US" dirty="0"/>
           </a:p>
@@ -20642,7 +20643,7 @@
           <a:p>
             <a:fld id="{52E37674-C1BA-4107-9B06-6D4CAC3A3DF5}" type="datetimeFigureOut">
               <a:rPr lang="en-US" dirty="0"/>
-              <a:t>9/6/2018</a:t>
+              <a:t>9/13/2018</a:t>
             </a:fld>
             <a:endParaRPr lang="en-US" dirty="0"/>
           </a:p>
@@ -22900,6 +22901,104 @@
     <p:extLst>
       <p:ext uri="{BB962C8B-B14F-4D97-AF65-F5344CB8AC3E}">
         <p14:creationId xmlns:p14="http://schemas.microsoft.com/office/powerpoint/2010/main" val="3045085797"/>
+      </p:ext>
+    </p:extLst>
+  </p:cSld>
+  <p:clrMapOvr>
+    <a:masterClrMapping/>
+  </p:clrMapOvr>
+</p:sld>
+</file>
+
+<file path=ppt/slides/slide17.xml><?xml version="1.0" encoding="utf-8"?>
+<p:sld xmlns:a="http://schemas.openxmlformats.org/drawingml/2006/main" xmlns:r="http://schemas.openxmlformats.org/officeDocument/2006/relationships" xmlns:p="http://schemas.openxmlformats.org/presentationml/2006/main">
+  <p:cSld>
+    <p:spTree>
+      <p:nvGrpSpPr>
+        <p:cNvPr id="1" name=""/>
+        <p:cNvGrpSpPr/>
+        <p:nvPr/>
+      </p:nvGrpSpPr>
+      <p:grpSpPr>
+        <a:xfrm>
+          <a:off x="0" y="0"/>
+          <a:ext cx="0" cy="0"/>
+          <a:chOff x="0" y="0"/>
+          <a:chExt cx="0" cy="0"/>
+        </a:xfrm>
+      </p:grpSpPr>
+      <p:sp>
+        <p:nvSpPr>
+          <p:cNvPr id="2" name="Título 1">
+            <a:extLst>
+              <a:ext uri="{FF2B5EF4-FFF2-40B4-BE49-F238E27FC236}">
+                <a16:creationId xmlns:a16="http://schemas.microsoft.com/office/drawing/2014/main" id="{72B4C1DE-F252-4DD0-94C5-DBA68CB96369}"/>
+              </a:ext>
+            </a:extLst>
+          </p:cNvPr>
+          <p:cNvSpPr>
+            <a:spLocks noGrp="1"/>
+          </p:cNvSpPr>
+          <p:nvPr>
+            <p:ph type="title"/>
+          </p:nvPr>
+        </p:nvSpPr>
+        <p:spPr/>
+        <p:txBody>
+          <a:bodyPr/>
+          <a:lstStyle/>
+          <a:p>
+            <a:r>
+              <a:rPr lang="es-MX" dirty="0"/>
+              <a:t>Ejercicio Evaluativo =30%</a:t>
+            </a:r>
+          </a:p>
+        </p:txBody>
+      </p:sp>
+      <p:sp>
+        <p:nvSpPr>
+          <p:cNvPr id="3" name="Marcador de contenido 2">
+            <a:extLst>
+              <a:ext uri="{FF2B5EF4-FFF2-40B4-BE49-F238E27FC236}">
+                <a16:creationId xmlns:a16="http://schemas.microsoft.com/office/drawing/2014/main" id="{7515728A-9A07-4755-ADC0-392DF17FAC4B}"/>
+              </a:ext>
+            </a:extLst>
+          </p:cNvPr>
+          <p:cNvSpPr>
+            <a:spLocks noGrp="1"/>
+          </p:cNvSpPr>
+          <p:nvPr>
+            <p:ph idx="1"/>
+          </p:nvPr>
+        </p:nvSpPr>
+        <p:spPr/>
+        <p:txBody>
+          <a:bodyPr/>
+          <a:lstStyle/>
+          <a:p>
+            <a:r>
+              <a:rPr lang="es-MX" dirty="0"/>
+              <a:t>Se pretende crear una aplicación para revisar los vuelos y determinar cual es el origen y destino de cada avión, Sin la necesidad de recurrir a un agente externo o humano. El sistema debe contar con una interfaz donde se exponga las características del avión marca, modelo, y los datos del viaje, tales como origen, destino, numero de vuelos,  además de saber la aerolínea para la cual asiste.</a:t>
+            </a:r>
+          </a:p>
+          <a:p>
+            <a:endParaRPr lang="es-MX" dirty="0"/>
+          </a:p>
+          <a:p>
+            <a:r>
+              <a:rPr lang="es-MX" dirty="0"/>
+              <a:t>Crear Diagrama de Clase especificando sus relaciones y objetos, atributos, tipos de datos, y operaciones</a:t>
+            </a:r>
+          </a:p>
+          <a:p>
+            <a:endParaRPr lang="es-MX" dirty="0"/>
+          </a:p>
+        </p:txBody>
+      </p:sp>
+    </p:spTree>
+    <p:extLst>
+      <p:ext uri="{BB962C8B-B14F-4D97-AF65-F5344CB8AC3E}">
+        <p14:creationId xmlns:p14="http://schemas.microsoft.com/office/powerpoint/2010/main" val="3484136508"/>
       </p:ext>
     </p:extLst>
   </p:cSld>

</xml_diff>